<commit_message>
Update sparrow virtual assistance python.pptx
</commit_message>
<xml_diff>
--- a/sparrow virtual assistance python.pptx
+++ b/sparrow virtual assistance python.pptx
@@ -28742,113 +28742,21 @@
             <p:ph type="title"/>
           </p:nvPr>
         </p:nvSpPr>
-        <p:spPr/>
+        <p:spPr>
+          <a:xfrm>
+            <a:off x="444500" y="542925"/>
+            <a:ext cx="11214100" cy="535531"/>
+          </a:xfrm>
+        </p:spPr>
         <p:txBody>
-          <a:bodyPr/>
+          <a:bodyPr vert="horz" wrap="square" lIns="91440" tIns="45720" rIns="91440" bIns="45720" rtlCol="0" anchor="t">
+            <a:normAutofit/>
+          </a:bodyPr>
           <a:lstStyle/>
           <a:p>
             <a:r>
-              <a:rPr lang="en-US" dirty="0"/>
+              <a:rPr lang="en-US" b="1" kern="1200" spc="-70" baseline="0"/>
               <a:t>Graphical User Interface</a:t>
-            </a:r>
-          </a:p>
-        </p:txBody>
-      </p:sp>
-      <p:pic>
-        <p:nvPicPr>
-          <p:cNvPr id="20" name="Picture Placeholder 19" descr="Triangular pattern design with dimension">
-            <a:extLst>
-              <a:ext uri="{FF2B5EF4-FFF2-40B4-BE49-F238E27FC236}">
-                <a16:creationId xmlns:a16="http://schemas.microsoft.com/office/drawing/2014/main" id="{3DCA2B8E-64D3-7645-8DEB-688ED5756F52}"/>
-              </a:ext>
-            </a:extLst>
-          </p:cNvPr>
-          <p:cNvPicPr>
-            <a:picLocks noGrp="1" noChangeAspect="1"/>
-          </p:cNvPicPr>
-          <p:nvPr>
-            <p:ph type="pic" sz="quarter" idx="19"/>
-          </p:nvPr>
-        </p:nvPicPr>
-        <p:blipFill>
-          <a:blip r:embed="rId2">
-            <a:extLst>
-              <a:ext uri="{28A0092B-C50C-407E-A947-70E740481C1C}">
-                <a14:useLocalDpi xmlns:a14="http://schemas.microsoft.com/office/drawing/2010/main" val="0"/>
-              </a:ext>
-            </a:extLst>
-          </a:blip>
-          <a:srcRect/>
-          <a:stretch>
-            <a:fillRect/>
-          </a:stretch>
-        </p:blipFill>
-        <p:spPr>
-          <a:xfrm>
-            <a:off x="-2" y="1352575"/>
-            <a:ext cx="12192002" cy="1885925"/>
-          </a:xfrm>
-        </p:spPr>
-      </p:pic>
-      <p:sp>
-        <p:nvSpPr>
-          <p:cNvPr id="19" name="Text Placeholder 18">
-            <a:extLst>
-              <a:ext uri="{FF2B5EF4-FFF2-40B4-BE49-F238E27FC236}">
-                <a16:creationId xmlns:a16="http://schemas.microsoft.com/office/drawing/2014/main" id="{782206B1-586F-4254-9B36-D06C4E294ACF}"/>
-              </a:ext>
-            </a:extLst>
-          </p:cNvPr>
-          <p:cNvSpPr>
-            <a:spLocks noGrp="1"/>
-          </p:cNvSpPr>
-          <p:nvPr>
-            <p:ph type="body" sz="quarter" idx="18"/>
-          </p:nvPr>
-        </p:nvSpPr>
-        <p:spPr>
-          <a:xfrm>
-            <a:off x="1168400" y="3337978"/>
-            <a:ext cx="4254500" cy="2877619"/>
-          </a:xfrm>
-        </p:spPr>
-        <p:txBody>
-          <a:bodyPr/>
-          <a:lstStyle/>
-          <a:p>
-            <a:r>
-              <a:rPr lang="en-US" sz="1800" dirty="0"/>
-              <a:t>Library: tkinter</a:t>
-            </a:r>
-          </a:p>
-          <a:p>
-            <a:r>
-              <a:rPr lang="en-US" sz="1800" dirty="0"/>
-              <a:t> Components:</a:t>
-            </a:r>
-          </a:p>
-          <a:p>
-            <a:r>
-              <a:rPr lang="en-US" sz="1800" dirty="0"/>
-              <a:t>  1. Microphone button (with custom image)</a:t>
-            </a:r>
-          </a:p>
-          <a:p>
-            <a:r>
-              <a:rPr lang="en-US" sz="1800" dirty="0"/>
-              <a:t>  2. Text input field</a:t>
-            </a:r>
-          </a:p>
-          <a:p>
-            <a:r>
-              <a:rPr lang="en-US" sz="1800" dirty="0"/>
-              <a:t>  3. Submit button</a:t>
-            </a:r>
-          </a:p>
-          <a:p>
-            <a:r>
-              <a:rPr lang="en-US" sz="1800" dirty="0"/>
-              <a:t>  4. Output text area</a:t>
             </a:r>
           </a:p>
         </p:txBody>
@@ -28869,20 +28777,157 @@
             <p:ph type="sldNum" sz="quarter" idx="12"/>
           </p:nvPr>
         </p:nvSpPr>
-        <p:spPr/>
+        <p:spPr>
+          <a:xfrm>
+            <a:off x="11252200" y="6315075"/>
+            <a:ext cx="406400" cy="365125"/>
+          </a:xfrm>
+        </p:spPr>
         <p:txBody>
-          <a:bodyPr/>
+          <a:bodyPr vert="horz" lIns="91440" tIns="45720" rIns="91440" bIns="45720" rtlCol="0" anchor="ctr">
+            <a:normAutofit/>
+          </a:bodyPr>
           <a:lstStyle/>
           <a:p>
+            <a:pPr>
+              <a:spcAft>
+                <a:spcPts val="600"/>
+              </a:spcAft>
+            </a:pPr>
             <a:fld id="{C263D6C4-4840-40CC-AC84-17E24B3B7BDE}" type="slidenum">
               <a:rPr lang="en-US" smtClean="0"/>
-              <a:pPr/>
+              <a:pPr>
+                <a:spcAft>
+                  <a:spcPts val="600"/>
+                </a:spcAft>
+              </a:pPr>
               <a:t>10</a:t>
             </a:fld>
-            <a:endParaRPr lang="en-US" dirty="0"/>
+            <a:endParaRPr lang="en-US"/>
           </a:p>
         </p:txBody>
       </p:sp>
+      <p:sp>
+        <p:nvSpPr>
+          <p:cNvPr id="19" name="Text Placeholder 18">
+            <a:extLst>
+              <a:ext uri="{FF2B5EF4-FFF2-40B4-BE49-F238E27FC236}">
+                <a16:creationId xmlns:a16="http://schemas.microsoft.com/office/drawing/2014/main" id="{782206B1-586F-4254-9B36-D06C4E294ACF}"/>
+              </a:ext>
+            </a:extLst>
+          </p:cNvPr>
+          <p:cNvSpPr>
+            <a:spLocks noGrp="1"/>
+          </p:cNvSpPr>
+          <p:nvPr>
+            <p:ph sz="half" idx="1"/>
+          </p:nvPr>
+        </p:nvSpPr>
+        <p:spPr>
+          <a:xfrm>
+            <a:off x="443365" y="1517715"/>
+            <a:ext cx="5184437" cy="4659248"/>
+          </a:xfrm>
+        </p:spPr>
+        <p:txBody>
+          <a:bodyPr vert="horz" lIns="91440" tIns="45720" rIns="91440" bIns="45720" rtlCol="0">
+            <a:normAutofit/>
+          </a:bodyPr>
+          <a:lstStyle/>
+          <a:p>
+            <a:r>
+              <a:rPr lang="en-US"/>
+              <a:t>Library: </a:t>
+            </a:r>
+            <a:r>
+              <a:rPr lang="en-US" err="1"/>
+              <a:t>tkinter</a:t>
+            </a:r>
+            <a:endParaRPr lang="en-US"/>
+          </a:p>
+          <a:p>
+            <a:r>
+              <a:rPr lang="en-US"/>
+              <a:t> Components:</a:t>
+            </a:r>
+          </a:p>
+          <a:p>
+            <a:r>
+              <a:rPr lang="en-US"/>
+              <a:t>  1. Microphone button (with custom image)</a:t>
+            </a:r>
+          </a:p>
+          <a:p>
+            <a:r>
+              <a:rPr lang="en-US"/>
+              <a:t>  2. Text input field</a:t>
+            </a:r>
+          </a:p>
+          <a:p>
+            <a:r>
+              <a:rPr lang="en-US"/>
+              <a:t>  3. Submit button</a:t>
+            </a:r>
+          </a:p>
+          <a:p>
+            <a:r>
+              <a:rPr lang="en-US"/>
+              <a:t>  4. Output text area</a:t>
+            </a:r>
+          </a:p>
+          <a:p>
+            <a:endParaRPr lang="en-US"/>
+          </a:p>
+          <a:p>
+            <a:r>
+              <a:rPr lang="en-US"/>
+              <a:t> Event Handling:</a:t>
+            </a:r>
+          </a:p>
+          <a:p>
+            <a:r>
+              <a:rPr lang="en-US"/>
+              <a:t>  • Button click events</a:t>
+            </a:r>
+          </a:p>
+          <a:p>
+            <a:r>
+              <a:rPr lang="en-US"/>
+              <a:t>  • Text input submission</a:t>
+            </a:r>
+          </a:p>
+        </p:txBody>
+      </p:sp>
+      <p:pic>
+        <p:nvPicPr>
+          <p:cNvPr id="5" name="Picture 4" descr="A screen shot of a computer&#10;&#10;Description automatically generated">
+            <a:extLst>
+              <a:ext uri="{FF2B5EF4-FFF2-40B4-BE49-F238E27FC236}">
+                <a16:creationId xmlns:a16="http://schemas.microsoft.com/office/drawing/2014/main" id="{236356F3-B333-FE42-C0A1-429699EE8FDD}"/>
+              </a:ext>
+            </a:extLst>
+          </p:cNvPr>
+          <p:cNvPicPr>
+            <a:picLocks noChangeAspect="1"/>
+          </p:cNvPicPr>
+          <p:nvPr/>
+        </p:nvPicPr>
+        <p:blipFill>
+          <a:blip r:embed="rId2"/>
+          <a:srcRect l="2068" r="8604" b="-2"/>
+          <a:stretch/>
+        </p:blipFill>
+        <p:spPr>
+          <a:xfrm>
+            <a:off x="6474163" y="2004589"/>
+            <a:ext cx="5184437" cy="3685499"/>
+          </a:xfrm>
+          <a:prstGeom prst="rect">
+            <a:avLst/>
+          </a:prstGeom>
+          <a:noFill/>
+        </p:spPr>
+      </p:pic>
       <p:sp>
         <p:nvSpPr>
           <p:cNvPr id="8" name="Text Placeholder 18">
@@ -28899,16 +28944,16 @@
         </p:nvSpPr>
         <p:spPr>
           <a:xfrm>
-            <a:off x="6299200" y="3345382"/>
-            <a:ext cx="3314700" cy="2318818"/>
+            <a:off x="6500812" y="1681163"/>
+            <a:ext cx="5157788" cy="823912"/>
           </a:xfrm>
           <a:prstGeom prst="rect">
             <a:avLst/>
           </a:prstGeom>
         </p:spPr>
         <p:txBody>
-          <a:bodyPr vert="horz" lIns="0" tIns="0" rIns="0" bIns="0" rtlCol="0">
-            <a:noAutofit/>
+          <a:bodyPr vert="horz" lIns="91440" tIns="45720" rIns="91440" bIns="45720" rtlCol="0" anchor="t">
+            <a:normAutofit/>
           </a:bodyPr>
           <a:lstStyle>
             <a:lvl1pPr marL="0" indent="0" algn="l" defTabSz="914400" rtl="0" eaLnBrk="1" latinLnBrk="0" hangingPunct="1">
@@ -29099,22 +29144,19 @@
             </a:lvl9pPr>
           </a:lstStyle>
           <a:p>
-            <a:r>
-              <a:rPr lang="en-US" sz="1800" dirty="0"/>
-              <a:t>  Event Handling:</a:t>
-            </a:r>
-          </a:p>
-          <a:p>
-            <a:r>
-              <a:rPr lang="en-US" sz="1800" dirty="0"/>
-              <a:t>  • Button click events</a:t>
-            </a:r>
-          </a:p>
-          <a:p>
-            <a:r>
-              <a:rPr lang="en-US" sz="1800" dirty="0"/>
-              <a:t>  • Text input submission</a:t>
-            </a:r>
+            <a:pPr algn="ctr">
+              <a:lnSpc>
+                <a:spcPct val="90000"/>
+              </a:lnSpc>
+              <a:spcBef>
+                <a:spcPts val="1000"/>
+              </a:spcBef>
+            </a:pPr>
+            <a:endParaRPr lang="en-US" sz="800" b="1" kern="1200" dirty="0">
+              <a:latin typeface="+mn-lt"/>
+              <a:ea typeface="+mn-ea"/>
+              <a:cs typeface="+mn-cs"/>
+            </a:endParaRPr>
           </a:p>
         </p:txBody>
       </p:sp>
@@ -32736,20 +32778,20 @@
 </file>
 
 <file path=customXml/item1.xml><?xml version="1.0" encoding="utf-8"?>
-<p:properties xmlns:p="http://schemas.microsoft.com/office/2006/metadata/properties" xmlns:xsi="http://www.w3.org/2001/XMLSchema-instance" xmlns:pc="http://schemas.microsoft.com/office/infopath/2007/PartnerControls">
-  <documentManagement>
-    <MediaServiceKeyPoints xmlns="71af3243-3dd4-4a8d-8c0d-dd76da1f02a5" xsi:nil="true"/>
-  </documentManagement>
-</p:properties>
-</file>
-
-<file path=customXml/item2.xml><?xml version="1.0" encoding="utf-8"?>
 <?mso-contentType ?>
 <FormTemplates xmlns="http://schemas.microsoft.com/sharepoint/v3/contenttype/forms">
   <Display>DocumentLibraryForm</Display>
   <Edit>DocumentLibraryForm</Edit>
   <New>DocumentLibraryForm</New>
 </FormTemplates>
+</file>
+
+<file path=customXml/item2.xml><?xml version="1.0" encoding="utf-8"?>
+<p:properties xmlns:p="http://schemas.microsoft.com/office/2006/metadata/properties" xmlns:xsi="http://www.w3.org/2001/XMLSchema-instance" xmlns:pc="http://schemas.microsoft.com/office/infopath/2007/PartnerControls">
+  <documentManagement>
+    <MediaServiceKeyPoints xmlns="71af3243-3dd4-4a8d-8c0d-dd76da1f02a5" xsi:nil="true"/>
+  </documentManagement>
+</p:properties>
 </file>
 
 <file path=customXml/item3.xml><?xml version="1.0" encoding="utf-8"?>
@@ -32964,19 +33006,19 @@
 </file>
 
 <file path=customXml/itemProps1.xml><?xml version="1.0" encoding="utf-8"?>
+<ds:datastoreItem xmlns:ds="http://schemas.openxmlformats.org/officeDocument/2006/customXml" ds:itemID="{5B26E0C9-B2AA-42E6-97B6-E1B7D9EAF129}">
+  <ds:schemaRefs>
+    <ds:schemaRef ds:uri="http://schemas.microsoft.com/sharepoint/v3/contenttype/forms"/>
+  </ds:schemaRefs>
+</ds:datastoreItem>
+</file>
+
+<file path=customXml/itemProps2.xml><?xml version="1.0" encoding="utf-8"?>
 <ds:datastoreItem xmlns:ds="http://schemas.openxmlformats.org/officeDocument/2006/customXml" ds:itemID="{F5757914-1161-4661-9696-421FD6935CDD}">
   <ds:schemaRefs>
     <ds:schemaRef ds:uri="http://schemas.microsoft.com/office/2006/metadata/properties"/>
     <ds:schemaRef ds:uri="http://schemas.microsoft.com/office/infopath/2007/PartnerControls"/>
     <ds:schemaRef ds:uri="71af3243-3dd4-4a8d-8c0d-dd76da1f02a5"/>
-  </ds:schemaRefs>
-</ds:datastoreItem>
-</file>
-
-<file path=customXml/itemProps2.xml><?xml version="1.0" encoding="utf-8"?>
-<ds:datastoreItem xmlns:ds="http://schemas.openxmlformats.org/officeDocument/2006/customXml" ds:itemID="{5B26E0C9-B2AA-42E6-97B6-E1B7D9EAF129}">
-  <ds:schemaRefs>
-    <ds:schemaRef ds:uri="http://schemas.microsoft.com/sharepoint/v3/contenttype/forms"/>
   </ds:schemaRefs>
 </ds:datastoreItem>
 </file>

</xml_diff>